<commit_message>
Corrijo ej 2 del tp 3
</commit_message>
<xml_diff>
--- a/tp3-proyectos/Imagenes.pptx
+++ b/tp3-proyectos/Imagenes.pptx
@@ -111,7 +111,7 @@
   </p:defaultTextStyle>
   <p:extLst>
     <p:ext uri="{EFAFB233-063F-42B5-8137-9DF3F51BA10A}">
-      <p15:sldGuideLst xmlns:p15="http://schemas.microsoft.com/office/powerpoint/2012/main" xmlns="">
+      <p15:sldGuideLst xmlns:p15="http://schemas.microsoft.com/office/powerpoint/2012/main">
         <p15:guide id="1" orient="horz" pos="2160">
           <p15:clr>
             <a:srgbClr val="A4A3A4"/>
@@ -303,7 +303,7 @@
             <a:fld id="{A173DF1F-6FD9-4134-ABE5-0680BC74F2FF}" type="slidenum">
               <a:rPr lang="es-AR" smtClean="0"/>
               <a:pPr/>
-              <a:t>‹Nº›</a:t>
+              <a:t>‹#›</a:t>
             </a:fld>
             <a:endParaRPr lang="es-AR"/>
           </a:p>
@@ -312,7 +312,7 @@
     </p:spTree>
     <p:extLst>
       <p:ext uri="{BB962C8B-B14F-4D97-AF65-F5344CB8AC3E}">
-        <p14:creationId xmlns:p14="http://schemas.microsoft.com/office/powerpoint/2010/main" xmlns="" val="1478221447"/>
+        <p14:creationId xmlns:p14="http://schemas.microsoft.com/office/powerpoint/2010/main" val="1478221447"/>
       </p:ext>
     </p:extLst>
   </p:cSld>
@@ -475,7 +475,7 @@
             <a:fld id="{A173DF1F-6FD9-4134-ABE5-0680BC74F2FF}" type="slidenum">
               <a:rPr lang="es-AR" smtClean="0"/>
               <a:pPr/>
-              <a:t>‹Nº›</a:t>
+              <a:t>‹#›</a:t>
             </a:fld>
             <a:endParaRPr lang="es-AR"/>
           </a:p>
@@ -484,7 +484,7 @@
     </p:spTree>
     <p:extLst>
       <p:ext uri="{BB962C8B-B14F-4D97-AF65-F5344CB8AC3E}">
-        <p14:creationId xmlns:p14="http://schemas.microsoft.com/office/powerpoint/2010/main" xmlns="" val="787665529"/>
+        <p14:creationId xmlns:p14="http://schemas.microsoft.com/office/powerpoint/2010/main" val="787665529"/>
       </p:ext>
     </p:extLst>
   </p:cSld>
@@ -657,7 +657,7 @@
             <a:fld id="{A173DF1F-6FD9-4134-ABE5-0680BC74F2FF}" type="slidenum">
               <a:rPr lang="es-AR" smtClean="0"/>
               <a:pPr/>
-              <a:t>‹Nº›</a:t>
+              <a:t>‹#›</a:t>
             </a:fld>
             <a:endParaRPr lang="es-AR"/>
           </a:p>
@@ -666,7 +666,7 @@
     </p:spTree>
     <p:extLst>
       <p:ext uri="{BB962C8B-B14F-4D97-AF65-F5344CB8AC3E}">
-        <p14:creationId xmlns:p14="http://schemas.microsoft.com/office/powerpoint/2010/main" xmlns="" val="3550571343"/>
+        <p14:creationId xmlns:p14="http://schemas.microsoft.com/office/powerpoint/2010/main" val="3550571343"/>
       </p:ext>
     </p:extLst>
   </p:cSld>
@@ -829,7 +829,7 @@
             <a:fld id="{A173DF1F-6FD9-4134-ABE5-0680BC74F2FF}" type="slidenum">
               <a:rPr lang="es-AR" smtClean="0"/>
               <a:pPr/>
-              <a:t>‹Nº›</a:t>
+              <a:t>‹#›</a:t>
             </a:fld>
             <a:endParaRPr lang="es-AR"/>
           </a:p>
@@ -838,7 +838,7 @@
     </p:spTree>
     <p:extLst>
       <p:ext uri="{BB962C8B-B14F-4D97-AF65-F5344CB8AC3E}">
-        <p14:creationId xmlns:p14="http://schemas.microsoft.com/office/powerpoint/2010/main" xmlns="" val="1090226818"/>
+        <p14:creationId xmlns:p14="http://schemas.microsoft.com/office/powerpoint/2010/main" val="1090226818"/>
       </p:ext>
     </p:extLst>
   </p:cSld>
@@ -1077,7 +1077,7 @@
             <a:fld id="{A173DF1F-6FD9-4134-ABE5-0680BC74F2FF}" type="slidenum">
               <a:rPr lang="es-AR" smtClean="0"/>
               <a:pPr/>
-              <a:t>‹Nº›</a:t>
+              <a:t>‹#›</a:t>
             </a:fld>
             <a:endParaRPr lang="es-AR"/>
           </a:p>
@@ -1086,7 +1086,7 @@
     </p:spTree>
     <p:extLst>
       <p:ext uri="{BB962C8B-B14F-4D97-AF65-F5344CB8AC3E}">
-        <p14:creationId xmlns:p14="http://schemas.microsoft.com/office/powerpoint/2010/main" xmlns="" val="1797381584"/>
+        <p14:creationId xmlns:p14="http://schemas.microsoft.com/office/powerpoint/2010/main" val="1797381584"/>
       </p:ext>
     </p:extLst>
   </p:cSld>
@@ -1311,7 +1311,7 @@
             <a:fld id="{A173DF1F-6FD9-4134-ABE5-0680BC74F2FF}" type="slidenum">
               <a:rPr lang="es-AR" smtClean="0"/>
               <a:pPr/>
-              <a:t>‹Nº›</a:t>
+              <a:t>‹#›</a:t>
             </a:fld>
             <a:endParaRPr lang="es-AR"/>
           </a:p>
@@ -1320,7 +1320,7 @@
     </p:spTree>
     <p:extLst>
       <p:ext uri="{BB962C8B-B14F-4D97-AF65-F5344CB8AC3E}">
-        <p14:creationId xmlns:p14="http://schemas.microsoft.com/office/powerpoint/2010/main" xmlns="" val="141320725"/>
+        <p14:creationId xmlns:p14="http://schemas.microsoft.com/office/powerpoint/2010/main" val="141320725"/>
       </p:ext>
     </p:extLst>
   </p:cSld>
@@ -1680,7 +1680,7 @@
             <a:fld id="{A173DF1F-6FD9-4134-ABE5-0680BC74F2FF}" type="slidenum">
               <a:rPr lang="es-AR" smtClean="0"/>
               <a:pPr/>
-              <a:t>‹Nº›</a:t>
+              <a:t>‹#›</a:t>
             </a:fld>
             <a:endParaRPr lang="es-AR"/>
           </a:p>
@@ -1689,7 +1689,7 @@
     </p:spTree>
     <p:extLst>
       <p:ext uri="{BB962C8B-B14F-4D97-AF65-F5344CB8AC3E}">
-        <p14:creationId xmlns:p14="http://schemas.microsoft.com/office/powerpoint/2010/main" xmlns="" val="898217691"/>
+        <p14:creationId xmlns:p14="http://schemas.microsoft.com/office/powerpoint/2010/main" val="898217691"/>
       </p:ext>
     </p:extLst>
   </p:cSld>
@@ -1800,7 +1800,7 @@
             <a:fld id="{A173DF1F-6FD9-4134-ABE5-0680BC74F2FF}" type="slidenum">
               <a:rPr lang="es-AR" smtClean="0"/>
               <a:pPr/>
-              <a:t>‹Nº›</a:t>
+              <a:t>‹#›</a:t>
             </a:fld>
             <a:endParaRPr lang="es-AR"/>
           </a:p>
@@ -1809,7 +1809,7 @@
     </p:spTree>
     <p:extLst>
       <p:ext uri="{BB962C8B-B14F-4D97-AF65-F5344CB8AC3E}">
-        <p14:creationId xmlns:p14="http://schemas.microsoft.com/office/powerpoint/2010/main" xmlns="" val="1734197303"/>
+        <p14:creationId xmlns:p14="http://schemas.microsoft.com/office/powerpoint/2010/main" val="1734197303"/>
       </p:ext>
     </p:extLst>
   </p:cSld>
@@ -1897,7 +1897,7 @@
             <a:fld id="{A173DF1F-6FD9-4134-ABE5-0680BC74F2FF}" type="slidenum">
               <a:rPr lang="es-AR" smtClean="0"/>
               <a:pPr/>
-              <a:t>‹Nº›</a:t>
+              <a:t>‹#›</a:t>
             </a:fld>
             <a:endParaRPr lang="es-AR"/>
           </a:p>
@@ -1906,7 +1906,7 @@
     </p:spTree>
     <p:extLst>
       <p:ext uri="{BB962C8B-B14F-4D97-AF65-F5344CB8AC3E}">
-        <p14:creationId xmlns:p14="http://schemas.microsoft.com/office/powerpoint/2010/main" xmlns="" val="2733380732"/>
+        <p14:creationId xmlns:p14="http://schemas.microsoft.com/office/powerpoint/2010/main" val="2733380732"/>
       </p:ext>
     </p:extLst>
   </p:cSld>
@@ -2176,7 +2176,7 @@
             <a:fld id="{A173DF1F-6FD9-4134-ABE5-0680BC74F2FF}" type="slidenum">
               <a:rPr lang="es-AR" smtClean="0"/>
               <a:pPr/>
-              <a:t>‹Nº›</a:t>
+              <a:t>‹#›</a:t>
             </a:fld>
             <a:endParaRPr lang="es-AR"/>
           </a:p>
@@ -2185,7 +2185,7 @@
     </p:spTree>
     <p:extLst>
       <p:ext uri="{BB962C8B-B14F-4D97-AF65-F5344CB8AC3E}">
-        <p14:creationId xmlns:p14="http://schemas.microsoft.com/office/powerpoint/2010/main" xmlns="" val="201515298"/>
+        <p14:creationId xmlns:p14="http://schemas.microsoft.com/office/powerpoint/2010/main" val="201515298"/>
       </p:ext>
     </p:extLst>
   </p:cSld>
@@ -2431,7 +2431,7 @@
             <a:fld id="{A173DF1F-6FD9-4134-ABE5-0680BC74F2FF}" type="slidenum">
               <a:rPr lang="es-AR" smtClean="0"/>
               <a:pPr/>
-              <a:t>‹Nº›</a:t>
+              <a:t>‹#›</a:t>
             </a:fld>
             <a:endParaRPr lang="es-AR"/>
           </a:p>
@@ -2440,7 +2440,7 @@
     </p:spTree>
     <p:extLst>
       <p:ext uri="{BB962C8B-B14F-4D97-AF65-F5344CB8AC3E}">
-        <p14:creationId xmlns:p14="http://schemas.microsoft.com/office/powerpoint/2010/main" xmlns="" val="976262354"/>
+        <p14:creationId xmlns:p14="http://schemas.microsoft.com/office/powerpoint/2010/main" val="976262354"/>
       </p:ext>
     </p:extLst>
   </p:cSld>
@@ -2682,7 +2682,7 @@
             <a:fld id="{A173DF1F-6FD9-4134-ABE5-0680BC74F2FF}" type="slidenum">
               <a:rPr lang="es-AR" smtClean="0"/>
               <a:pPr/>
-              <a:t>‹Nº›</a:t>
+              <a:t>‹#›</a:t>
             </a:fld>
             <a:endParaRPr lang="es-AR"/>
           </a:p>
@@ -2691,7 +2691,7 @@
     </p:spTree>
     <p:extLst>
       <p:ext uri="{BB962C8B-B14F-4D97-AF65-F5344CB8AC3E}">
-        <p14:creationId xmlns:p14="http://schemas.microsoft.com/office/powerpoint/2010/main" xmlns="" val="2905328256"/>
+        <p14:creationId xmlns:p14="http://schemas.microsoft.com/office/powerpoint/2010/main" val="2905328256"/>
       </p:ext>
     </p:extLst>
   </p:cSld>
@@ -3588,7 +3588,7 @@
     </p:spTree>
     <p:extLst>
       <p:ext uri="{BB962C8B-B14F-4D97-AF65-F5344CB8AC3E}">
-        <p14:creationId xmlns:p14="http://schemas.microsoft.com/office/powerpoint/2010/main" xmlns="" val="546631854"/>
+        <p14:creationId xmlns:p14="http://schemas.microsoft.com/office/powerpoint/2010/main" val="546631854"/>
       </p:ext>
     </p:extLst>
   </p:cSld>
@@ -6977,7 +6977,7 @@
     </p:spTree>
     <p:extLst>
       <p:ext uri="{BB962C8B-B14F-4D97-AF65-F5344CB8AC3E}">
-        <p14:creationId xmlns:p14="http://schemas.microsoft.com/office/powerpoint/2010/main" xmlns="" val="546631854"/>
+        <p14:creationId xmlns:p14="http://schemas.microsoft.com/office/powerpoint/2010/main" val="546631854"/>
       </p:ext>
     </p:extLst>
   </p:cSld>
@@ -9185,14 +9185,12 @@
       <p:cxnSp>
         <p:nvCxnSpPr>
           <p:cNvPr id="96" name="41 Conector recto de flecha"/>
-          <p:cNvCxnSpPr>
-            <a:endCxn id="100" idx="2"/>
-          </p:cNvCxnSpPr>
-          <p:nvPr/>
-        </p:nvCxnSpPr>
-        <p:spPr>
-          <a:xfrm>
-            <a:off x="9407171" y="3440385"/>
+          <p:cNvCxnSpPr/>
+          <p:nvPr/>
+        </p:nvCxnSpPr>
+        <p:spPr>
+          <a:xfrm>
+            <a:off x="8067242" y="5130120"/>
             <a:ext cx="674083" cy="5375"/>
           </a:xfrm>
           <a:prstGeom prst="straightConnector1">
@@ -9225,7 +9223,7 @@
         </p:nvSpPr>
         <p:spPr>
           <a:xfrm>
-            <a:off x="9569698" y="3069214"/>
+            <a:off x="8170116" y="4780446"/>
             <a:ext cx="330540" cy="369332"/>
           </a:xfrm>
           <a:prstGeom prst="rect">
@@ -9255,7 +9253,7 @@
         </p:nvSpPr>
         <p:spPr>
           <a:xfrm>
-            <a:off x="9667110" y="3529976"/>
+            <a:off x="8267528" y="5241208"/>
             <a:ext cx="276038" cy="307777"/>
           </a:xfrm>
           <a:prstGeom prst="rect">
@@ -9293,7 +9291,7 @@
         </p:nvGrpSpPr>
         <p:grpSpPr>
           <a:xfrm>
-            <a:off x="10081254" y="3097940"/>
+            <a:off x="8824714" y="4813714"/>
             <a:ext cx="767081" cy="695640"/>
             <a:chOff x="4134779" y="3104530"/>
             <a:chExt cx="767081" cy="695640"/>
@@ -9438,7 +9436,7 @@
             <a:p>
               <a:r>
                 <a:rPr lang="es-AR" dirty="0" smtClean="0"/>
-                <a:t>8</a:t>
+                <a:t>9</a:t>
               </a:r>
               <a:endParaRPr lang="es-AR" dirty="0"/>
             </a:p>
@@ -9505,230 +9503,6 @@
           </p:txBody>
         </p:sp>
       </p:grpSp>
-      <p:sp>
-        <p:nvSpPr>
-          <p:cNvPr id="110" name="Freeform 109"/>
-          <p:cNvSpPr/>
-          <p:nvPr/>
-        </p:nvSpPr>
-        <p:spPr>
-          <a:xfrm>
-            <a:off x="6168980" y="1635616"/>
-            <a:ext cx="3045228" cy="1507047"/>
-          </a:xfrm>
-          <a:custGeom>
-            <a:avLst/>
-            <a:gdLst>
-              <a:gd name="connsiteX0" fmla="*/ 0 w 2980231"/>
-              <a:gd name="connsiteY0" fmla="*/ 1862964 h 1876062"/>
-              <a:gd name="connsiteX1" fmla="*/ 721217 w 2980231"/>
-              <a:gd name="connsiteY1" fmla="*/ 356136 h 1876062"/>
-              <a:gd name="connsiteX2" fmla="*/ 2730321 w 2980231"/>
-              <a:gd name="connsiteY2" fmla="*/ 111437 h 1876062"/>
-              <a:gd name="connsiteX3" fmla="*/ 2949262 w 2980231"/>
-              <a:gd name="connsiteY3" fmla="*/ 1837206 h 1876062"/>
-              <a:gd name="connsiteX4" fmla="*/ 2949262 w 2980231"/>
-              <a:gd name="connsiteY4" fmla="*/ 1837206 h 1876062"/>
-              <a:gd name="connsiteX5" fmla="*/ 2962141 w 2980231"/>
-              <a:gd name="connsiteY5" fmla="*/ 1875843 h 1876062"/>
-              <a:gd name="connsiteX6" fmla="*/ 2962141 w 2980231"/>
-              <a:gd name="connsiteY6" fmla="*/ 1850085 h 1876062"/>
-            </a:gdLst>
-            <a:ahLst/>
-            <a:cxnLst>
-              <a:cxn ang="0">
-                <a:pos x="connsiteX0" y="connsiteY0"/>
-              </a:cxn>
-              <a:cxn ang="0">
-                <a:pos x="connsiteX1" y="connsiteY1"/>
-              </a:cxn>
-              <a:cxn ang="0">
-                <a:pos x="connsiteX2" y="connsiteY2"/>
-              </a:cxn>
-              <a:cxn ang="0">
-                <a:pos x="connsiteX3" y="connsiteY3"/>
-              </a:cxn>
-              <a:cxn ang="0">
-                <a:pos x="connsiteX4" y="connsiteY4"/>
-              </a:cxn>
-              <a:cxn ang="0">
-                <a:pos x="connsiteX5" y="connsiteY5"/>
-              </a:cxn>
-              <a:cxn ang="0">
-                <a:pos x="connsiteX6" y="connsiteY6"/>
-              </a:cxn>
-            </a:cxnLst>
-            <a:rect l="l" t="t" r="r" b="b"/>
-            <a:pathLst>
-              <a:path w="2980231" h="1876062">
-                <a:moveTo>
-                  <a:pt x="0" y="1862964"/>
-                </a:moveTo>
-                <a:cubicBezTo>
-                  <a:pt x="133082" y="1255510"/>
-                  <a:pt x="266164" y="648057"/>
-                  <a:pt x="721217" y="356136"/>
-                </a:cubicBezTo>
-                <a:cubicBezTo>
-                  <a:pt x="1176271" y="64215"/>
-                  <a:pt x="2358980" y="-135408"/>
-                  <a:pt x="2730321" y="111437"/>
-                </a:cubicBezTo>
-                <a:cubicBezTo>
-                  <a:pt x="3101662" y="358282"/>
-                  <a:pt x="2949262" y="1837206"/>
-                  <a:pt x="2949262" y="1837206"/>
-                </a:cubicBezTo>
-                <a:lnTo>
-                  <a:pt x="2949262" y="1837206"/>
-                </a:lnTo>
-                <a:cubicBezTo>
-                  <a:pt x="2951408" y="1843645"/>
-                  <a:pt x="2959995" y="1873697"/>
-                  <a:pt x="2962141" y="1875843"/>
-                </a:cubicBezTo>
-                <a:cubicBezTo>
-                  <a:pt x="2964287" y="1877989"/>
-                  <a:pt x="2963214" y="1864037"/>
-                  <a:pt x="2962141" y="1850085"/>
-                </a:cubicBezTo>
-              </a:path>
-            </a:pathLst>
-          </a:custGeom>
-          <a:noFill/>
-          <a:ln>
-            <a:prstDash val="dash"/>
-            <a:headEnd type="none" w="med" len="med"/>
-            <a:tailEnd type="triangle" w="med" len="med"/>
-          </a:ln>
-        </p:spPr>
-        <p:style>
-          <a:lnRef idx="2">
-            <a:schemeClr val="accent1">
-              <a:shade val="50000"/>
-            </a:schemeClr>
-          </a:lnRef>
-          <a:fillRef idx="1">
-            <a:schemeClr val="accent1"/>
-          </a:fillRef>
-          <a:effectRef idx="0">
-            <a:schemeClr val="accent1"/>
-          </a:effectRef>
-          <a:fontRef idx="minor">
-            <a:schemeClr val="lt1"/>
-          </a:fontRef>
-        </p:style>
-        <p:txBody>
-          <a:bodyPr rtlCol="0" anchor="ctr"/>
-          <a:lstStyle/>
-          <a:p>
-            <a:pPr algn="ctr"/>
-            <a:endParaRPr lang="en-US"/>
-          </a:p>
-        </p:txBody>
-      </p:sp>
-      <p:sp>
-        <p:nvSpPr>
-          <p:cNvPr id="111" name="Freeform 110"/>
-          <p:cNvSpPr/>
-          <p:nvPr/>
-        </p:nvSpPr>
-        <p:spPr>
-          <a:xfrm>
-            <a:off x="7600412" y="2355774"/>
-            <a:ext cx="1496907" cy="760913"/>
-          </a:xfrm>
-          <a:custGeom>
-            <a:avLst/>
-            <a:gdLst>
-              <a:gd name="connsiteX0" fmla="*/ 11002 w 1496907"/>
-              <a:gd name="connsiteY0" fmla="*/ 748034 h 760913"/>
-              <a:gd name="connsiteX1" fmla="*/ 191306 w 1496907"/>
-              <a:gd name="connsiteY1" fmla="*/ 129849 h 760913"/>
-              <a:gd name="connsiteX2" fmla="*/ 1324647 w 1496907"/>
-              <a:gd name="connsiteY2" fmla="*/ 52575 h 760913"/>
-              <a:gd name="connsiteX3" fmla="*/ 1492073 w 1496907"/>
-              <a:gd name="connsiteY3" fmla="*/ 760913 h 760913"/>
-              <a:gd name="connsiteX4" fmla="*/ 1492073 w 1496907"/>
-              <a:gd name="connsiteY4" fmla="*/ 760913 h 760913"/>
-            </a:gdLst>
-            <a:ahLst/>
-            <a:cxnLst>
-              <a:cxn ang="0">
-                <a:pos x="connsiteX0" y="connsiteY0"/>
-              </a:cxn>
-              <a:cxn ang="0">
-                <a:pos x="connsiteX1" y="connsiteY1"/>
-              </a:cxn>
-              <a:cxn ang="0">
-                <a:pos x="connsiteX2" y="connsiteY2"/>
-              </a:cxn>
-              <a:cxn ang="0">
-                <a:pos x="connsiteX3" y="connsiteY3"/>
-              </a:cxn>
-              <a:cxn ang="0">
-                <a:pos x="connsiteX4" y="connsiteY4"/>
-              </a:cxn>
-            </a:cxnLst>
-            <a:rect l="l" t="t" r="r" b="b"/>
-            <a:pathLst>
-              <a:path w="1496907" h="760913">
-                <a:moveTo>
-                  <a:pt x="11002" y="748034"/>
-                </a:moveTo>
-                <a:cubicBezTo>
-                  <a:pt x="-8317" y="496896"/>
-                  <a:pt x="-27635" y="245759"/>
-                  <a:pt x="191306" y="129849"/>
-                </a:cubicBezTo>
-                <a:cubicBezTo>
-                  <a:pt x="410247" y="13939"/>
-                  <a:pt x="1107853" y="-52602"/>
-                  <a:pt x="1324647" y="52575"/>
-                </a:cubicBezTo>
-                <a:cubicBezTo>
-                  <a:pt x="1541441" y="157752"/>
-                  <a:pt x="1492073" y="760913"/>
-                  <a:pt x="1492073" y="760913"/>
-                </a:cubicBezTo>
-                <a:lnTo>
-                  <a:pt x="1492073" y="760913"/>
-                </a:lnTo>
-              </a:path>
-            </a:pathLst>
-          </a:custGeom>
-          <a:noFill/>
-          <a:ln>
-            <a:prstDash val="dash"/>
-            <a:headEnd type="none" w="med" len="med"/>
-            <a:tailEnd type="triangle" w="med" len="med"/>
-          </a:ln>
-        </p:spPr>
-        <p:style>
-          <a:lnRef idx="2">
-            <a:schemeClr val="accent1">
-              <a:shade val="50000"/>
-            </a:schemeClr>
-          </a:lnRef>
-          <a:fillRef idx="1">
-            <a:schemeClr val="accent1"/>
-          </a:fillRef>
-          <a:effectRef idx="0">
-            <a:schemeClr val="accent1"/>
-          </a:effectRef>
-          <a:fontRef idx="minor">
-            <a:schemeClr val="lt1"/>
-          </a:fontRef>
-        </p:style>
-        <p:txBody>
-          <a:bodyPr rtlCol="0" anchor="ctr"/>
-          <a:lstStyle/>
-          <a:p>
-            <a:pPr algn="ctr"/>
-            <a:endParaRPr lang="en-US"/>
-          </a:p>
-        </p:txBody>
-      </p:sp>
       <p:cxnSp>
         <p:nvCxnSpPr>
           <p:cNvPr id="112" name="49 Conector recto de flecha"/>
@@ -9937,7 +9711,7 @@
         </p:nvCxnSpPr>
         <p:spPr>
           <a:xfrm>
-            <a:off x="9399220" y="3538864"/>
+            <a:off x="8042384" y="5193159"/>
             <a:ext cx="698199" cy="14253"/>
           </a:xfrm>
           <a:prstGeom prst="straightConnector1">
@@ -9962,10 +9736,336 @@
           </a:fontRef>
         </p:style>
       </p:cxnSp>
+      <p:grpSp>
+        <p:nvGrpSpPr>
+          <p:cNvPr id="88" name="Group 87"/>
+          <p:cNvGrpSpPr/>
+          <p:nvPr/>
+        </p:nvGrpSpPr>
+        <p:grpSpPr>
+          <a:xfrm>
+            <a:off x="7276026" y="4784988"/>
+            <a:ext cx="767081" cy="695640"/>
+            <a:chOff x="4134779" y="3104530"/>
+            <a:chExt cx="767081" cy="695640"/>
+          </a:xfrm>
+        </p:grpSpPr>
+        <p:sp>
+          <p:nvSpPr>
+            <p:cNvPr id="89" name="Oval 3"/>
+            <p:cNvSpPr/>
+            <p:nvPr/>
+          </p:nvSpPr>
+          <p:spPr>
+            <a:xfrm>
+              <a:off x="4134779" y="3104530"/>
+              <a:ext cx="710983" cy="695640"/>
+            </a:xfrm>
+            <a:prstGeom prst="ellipse">
+              <a:avLst/>
+            </a:prstGeom>
+            <a:ln>
+              <a:solidFill>
+                <a:schemeClr val="tx2"/>
+              </a:solidFill>
+            </a:ln>
+            <a:effectLst>
+              <a:outerShdw blurRad="50800" dist="38100" dir="2700000" algn="tl" rotWithShape="0">
+                <a:prstClr val="black">
+                  <a:alpha val="40000"/>
+                </a:prstClr>
+              </a:outerShdw>
+            </a:effectLst>
+          </p:spPr>
+          <p:style>
+            <a:lnRef idx="2">
+              <a:schemeClr val="accent6"/>
+            </a:lnRef>
+            <a:fillRef idx="1">
+              <a:schemeClr val="lt1"/>
+            </a:fillRef>
+            <a:effectRef idx="0">
+              <a:schemeClr val="accent6"/>
+            </a:effectRef>
+            <a:fontRef idx="minor">
+              <a:schemeClr val="dk1"/>
+            </a:fontRef>
+          </p:style>
+          <p:txBody>
+            <a:bodyPr rtlCol="0" anchor="ctr"/>
+            <a:lstStyle/>
+            <a:p>
+              <a:pPr algn="ctr"/>
+              <a:endParaRPr lang="es-AR"/>
+            </a:p>
+          </p:txBody>
+        </p:sp>
+        <p:cxnSp>
+          <p:nvCxnSpPr>
+            <p:cNvPr id="90" name="39 Conector recto"/>
+            <p:cNvCxnSpPr>
+              <a:stCxn id="89" idx="0"/>
+              <a:endCxn id="89" idx="4"/>
+            </p:cNvCxnSpPr>
+            <p:nvPr/>
+          </p:nvCxnSpPr>
+          <p:spPr>
+            <a:xfrm>
+              <a:off x="4490271" y="3104530"/>
+              <a:ext cx="0" cy="695640"/>
+            </a:xfrm>
+            <a:prstGeom prst="line">
+              <a:avLst/>
+            </a:prstGeom>
+          </p:spPr>
+          <p:style>
+            <a:lnRef idx="1">
+              <a:schemeClr val="accent1"/>
+            </a:lnRef>
+            <a:fillRef idx="0">
+              <a:schemeClr val="accent1"/>
+            </a:fillRef>
+            <a:effectRef idx="0">
+              <a:schemeClr val="accent1"/>
+            </a:effectRef>
+            <a:fontRef idx="minor">
+              <a:schemeClr val="tx1"/>
+            </a:fontRef>
+          </p:style>
+        </p:cxnSp>
+        <p:cxnSp>
+          <p:nvCxnSpPr>
+            <p:cNvPr id="91" name="40 Conector recto"/>
+            <p:cNvCxnSpPr>
+              <a:stCxn id="89" idx="6"/>
+            </p:cNvCxnSpPr>
+            <p:nvPr/>
+          </p:nvCxnSpPr>
+          <p:spPr>
+            <a:xfrm flipH="1">
+              <a:off x="4498921" y="3452350"/>
+              <a:ext cx="346841" cy="978"/>
+            </a:xfrm>
+            <a:prstGeom prst="line">
+              <a:avLst/>
+            </a:prstGeom>
+          </p:spPr>
+          <p:style>
+            <a:lnRef idx="1">
+              <a:schemeClr val="accent1"/>
+            </a:lnRef>
+            <a:fillRef idx="0">
+              <a:schemeClr val="accent1"/>
+            </a:fillRef>
+            <a:effectRef idx="0">
+              <a:schemeClr val="accent1"/>
+            </a:effectRef>
+            <a:fontRef idx="minor">
+              <a:schemeClr val="tx1"/>
+            </a:fontRef>
+          </p:style>
+        </p:cxnSp>
+        <p:sp>
+          <p:nvSpPr>
+            <p:cNvPr id="92" name="41 CuadroTexto"/>
+            <p:cNvSpPr txBox="1"/>
+            <p:nvPr/>
+          </p:nvSpPr>
+          <p:spPr>
+            <a:xfrm>
+              <a:off x="4157335" y="3269398"/>
+              <a:ext cx="301686" cy="369332"/>
+            </a:xfrm>
+            <a:prstGeom prst="rect">
+              <a:avLst/>
+            </a:prstGeom>
+            <a:noFill/>
+          </p:spPr>
+          <p:txBody>
+            <a:bodyPr wrap="none" rtlCol="0">
+              <a:spAutoFit/>
+            </a:bodyPr>
+            <a:lstStyle/>
+            <a:p>
+              <a:r>
+                <a:rPr lang="es-AR" dirty="0" smtClean="0"/>
+                <a:t>8</a:t>
+              </a:r>
+              <a:endParaRPr lang="es-AR" dirty="0"/>
+            </a:p>
+          </p:txBody>
+        </p:sp>
+        <p:sp>
+          <p:nvSpPr>
+            <p:cNvPr id="93" name="42 CuadroTexto"/>
+            <p:cNvSpPr txBox="1"/>
+            <p:nvPr/>
+          </p:nvSpPr>
+          <p:spPr>
+            <a:xfrm>
+              <a:off x="4483156" y="3111744"/>
+              <a:ext cx="418704" cy="369332"/>
+            </a:xfrm>
+            <a:prstGeom prst="rect">
+              <a:avLst/>
+            </a:prstGeom>
+            <a:noFill/>
+          </p:spPr>
+          <p:txBody>
+            <a:bodyPr wrap="none" rtlCol="0">
+              <a:spAutoFit/>
+            </a:bodyPr>
+            <a:lstStyle/>
+            <a:p>
+              <a:r>
+                <a:rPr lang="es-AR" dirty="0" smtClean="0"/>
+                <a:t>62</a:t>
+              </a:r>
+              <a:endParaRPr lang="es-AR" dirty="0"/>
+            </a:p>
+          </p:txBody>
+        </p:sp>
+        <p:sp>
+          <p:nvSpPr>
+            <p:cNvPr id="94" name="43 CuadroTexto"/>
+            <p:cNvSpPr txBox="1"/>
+            <p:nvPr/>
+          </p:nvSpPr>
+          <p:spPr>
+            <a:xfrm>
+              <a:off x="4483156" y="3395522"/>
+              <a:ext cx="418704" cy="369332"/>
+            </a:xfrm>
+            <a:prstGeom prst="rect">
+              <a:avLst/>
+            </a:prstGeom>
+            <a:noFill/>
+          </p:spPr>
+          <p:txBody>
+            <a:bodyPr wrap="none" rtlCol="0">
+              <a:spAutoFit/>
+            </a:bodyPr>
+            <a:lstStyle/>
+            <a:p>
+              <a:r>
+                <a:rPr lang="es-AR" dirty="0" smtClean="0"/>
+                <a:t>62</a:t>
+              </a:r>
+              <a:endParaRPr lang="es-AR" dirty="0"/>
+            </a:p>
+          </p:txBody>
+        </p:sp>
+      </p:grpSp>
+      <p:cxnSp>
+        <p:nvCxnSpPr>
+          <p:cNvPr id="95" name="41 Conector recto de flecha"/>
+          <p:cNvCxnSpPr>
+            <a:endCxn id="89" idx="1"/>
+          </p:cNvCxnSpPr>
+          <p:nvPr/>
+        </p:nvCxnSpPr>
+        <p:spPr>
+          <a:xfrm>
+            <a:off x="6337571" y="3800170"/>
+            <a:ext cx="1042576" cy="1086692"/>
+          </a:xfrm>
+          <a:prstGeom prst="straightConnector1">
+            <a:avLst/>
+          </a:prstGeom>
+          <a:ln>
+            <a:prstDash val="lgDash"/>
+            <a:tailEnd type="arrow"/>
+          </a:ln>
+        </p:spPr>
+        <p:style>
+          <a:lnRef idx="1">
+            <a:schemeClr val="accent1"/>
+          </a:lnRef>
+          <a:fillRef idx="0">
+            <a:schemeClr val="accent1"/>
+          </a:fillRef>
+          <a:effectRef idx="0">
+            <a:schemeClr val="accent1"/>
+          </a:effectRef>
+          <a:fontRef idx="minor">
+            <a:schemeClr val="tx1"/>
+          </a:fontRef>
+        </p:style>
+      </p:cxnSp>
+      <p:cxnSp>
+        <p:nvCxnSpPr>
+          <p:cNvPr id="106" name="41 Conector recto de flecha"/>
+          <p:cNvCxnSpPr>
+            <a:endCxn id="89" idx="0"/>
+          </p:cNvCxnSpPr>
+          <p:nvPr/>
+        </p:nvCxnSpPr>
+        <p:spPr>
+          <a:xfrm flipH="1">
+            <a:off x="7631518" y="3812257"/>
+            <a:ext cx="13719" cy="972731"/>
+          </a:xfrm>
+          <a:prstGeom prst="straightConnector1">
+            <a:avLst/>
+          </a:prstGeom>
+          <a:ln>
+            <a:prstDash val="lgDash"/>
+            <a:tailEnd type="arrow"/>
+          </a:ln>
+        </p:spPr>
+        <p:style>
+          <a:lnRef idx="1">
+            <a:schemeClr val="accent1"/>
+          </a:lnRef>
+          <a:fillRef idx="0">
+            <a:schemeClr val="accent1"/>
+          </a:fillRef>
+          <a:effectRef idx="0">
+            <a:schemeClr val="accent1"/>
+          </a:effectRef>
+          <a:fontRef idx="minor">
+            <a:schemeClr val="tx1"/>
+          </a:fontRef>
+        </p:style>
+      </p:cxnSp>
+      <p:cxnSp>
+        <p:nvCxnSpPr>
+          <p:cNvPr id="107" name="41 Conector recto de flecha"/>
+          <p:cNvCxnSpPr/>
+          <p:nvPr/>
+        </p:nvCxnSpPr>
+        <p:spPr>
+          <a:xfrm flipH="1">
+            <a:off x="7862057" y="3827478"/>
+            <a:ext cx="994091" cy="1059384"/>
+          </a:xfrm>
+          <a:prstGeom prst="straightConnector1">
+            <a:avLst/>
+          </a:prstGeom>
+          <a:ln>
+            <a:prstDash val="lgDash"/>
+            <a:tailEnd type="arrow"/>
+          </a:ln>
+        </p:spPr>
+        <p:style>
+          <a:lnRef idx="1">
+            <a:schemeClr val="accent1"/>
+          </a:lnRef>
+          <a:fillRef idx="0">
+            <a:schemeClr val="accent1"/>
+          </a:fillRef>
+          <a:effectRef idx="0">
+            <a:schemeClr val="accent1"/>
+          </a:effectRef>
+          <a:fontRef idx="minor">
+            <a:schemeClr val="tx1"/>
+          </a:fontRef>
+        </p:style>
+      </p:cxnSp>
     </p:spTree>
     <p:extLst>
       <p:ext uri="{BB962C8B-B14F-4D97-AF65-F5344CB8AC3E}">
-        <p14:creationId xmlns:p14="http://schemas.microsoft.com/office/powerpoint/2010/main" xmlns="" val="546631854"/>
+        <p14:creationId xmlns:p14="http://schemas.microsoft.com/office/powerpoint/2010/main" val="546631854"/>
       </p:ext>
     </p:extLst>
   </p:cSld>
@@ -14309,7 +14409,7 @@
     </p:spTree>
     <p:extLst>
       <p:ext uri="{BB962C8B-B14F-4D97-AF65-F5344CB8AC3E}">
-        <p14:creationId xmlns:p14="http://schemas.microsoft.com/office/powerpoint/2010/main" xmlns="" val="546631854"/>
+        <p14:creationId xmlns:p14="http://schemas.microsoft.com/office/powerpoint/2010/main" val="546631854"/>
       </p:ext>
     </p:extLst>
   </p:cSld>
@@ -14482,11 +14582,7 @@
           <a:p>
             <a:r>
               <a:rPr lang="es-AR" dirty="0" smtClean="0"/>
-              <a:t>EJERCICIO </a:t>
-            </a:r>
-            <a:r>
-              <a:rPr lang="es-AR" dirty="0" smtClean="0"/>
-              <a:t>3.2.1</a:t>
+              <a:t>EJERCICIO 3.2.1</a:t>
             </a:r>
             <a:endParaRPr lang="es-AR" dirty="0"/>
           </a:p>
@@ -18657,7 +18753,7 @@
     </p:spTree>
     <p:extLst>
       <p:ext uri="{BB962C8B-B14F-4D97-AF65-F5344CB8AC3E}">
-        <p14:creationId xmlns:p14="http://schemas.microsoft.com/office/powerpoint/2010/main" xmlns="" val="546631854"/>
+        <p14:creationId xmlns:p14="http://schemas.microsoft.com/office/powerpoint/2010/main" val="546631854"/>
       </p:ext>
     </p:extLst>
   </p:cSld>
@@ -18830,11 +18926,7 @@
           <a:p>
             <a:r>
               <a:rPr lang="es-AR" dirty="0" smtClean="0"/>
-              <a:t>EJERCICIO </a:t>
-            </a:r>
-            <a:r>
-              <a:rPr lang="es-AR" dirty="0" smtClean="0"/>
-              <a:t>3.2.2</a:t>
+              <a:t>EJERCICIO 3.2.2</a:t>
             </a:r>
             <a:endParaRPr lang="es-AR" dirty="0"/>
           </a:p>
@@ -23005,7 +23097,7 @@
     </p:spTree>
     <p:extLst>
       <p:ext uri="{BB962C8B-B14F-4D97-AF65-F5344CB8AC3E}">
-        <p14:creationId xmlns:p14="http://schemas.microsoft.com/office/powerpoint/2010/main" xmlns="" val="546631854"/>
+        <p14:creationId xmlns:p14="http://schemas.microsoft.com/office/powerpoint/2010/main" val="546631854"/>
       </p:ext>
     </p:extLst>
   </p:cSld>
@@ -23277,7 +23369,7 @@
   <a:extraClrSchemeLst/>
   <a:extLst>
     <a:ext uri="{05A4C25C-085E-4340-85A3-A5531E510DB2}">
-      <thm15:themeFamily xmlns:thm15="http://schemas.microsoft.com/office/thememl/2012/main" xmlns="" name="Office Theme" id="{62F939B6-93AF-4DB8-9C6B-D6C7DFDC589F}" vid="{4A3C46E8-61CC-4603-A589-7422A47A8E4A}"/>
+      <thm15:themeFamily xmlns:thm15="http://schemas.microsoft.com/office/thememl/2012/main" name="Office Theme" id="{62F939B6-93AF-4DB8-9C6B-D6C7DFDC589F}" vid="{4A3C46E8-61CC-4603-A589-7422A47A8E4A}"/>
     </a:ext>
   </a:extLst>
 </a:theme>

</xml_diff>